<commit_message>
Move lab 1 slides to the lab 1 folder
</commit_message>
<xml_diff>
--- a/KaipingAdina's Section Material/Intro Section/IntroSection.pptx
+++ b/KaipingAdina's Section Material/Intro Section/IntroSection.pptx
@@ -274,7 +274,7 @@
             <a:fld id="{CAB1EE62-9229-464B-9475-CBB16B62B2C7}" type="datetimeFigureOut">
               <a:rPr lang="en-US" altLang="x-none"/>
               <a:pPr/>
-              <a:t>1/22/17</a:t>
+              <a:t>1/23/17</a:t>
             </a:fld>
             <a:endParaRPr lang="en-US" altLang="x-none"/>
           </a:p>
@@ -480,7 +480,7 @@
             <a:fld id="{CBB815AF-F648-9E4A-8316-BB240D8FD2E6}" type="datetimeFigureOut">
               <a:rPr lang="en-US" altLang="x-none"/>
               <a:pPr/>
-              <a:t>1/22/17</a:t>
+              <a:t>1/23/17</a:t>
             </a:fld>
             <a:endParaRPr lang="en-US" altLang="x-none"/>
           </a:p>
@@ -1477,11 +1477,7 @@
           <a:p>
             <a:r>
               <a:rPr lang="en-US" baseline="0" dirty="0" smtClean="0"/>
-              <a:t>5 </a:t>
-            </a:r>
-            <a:r>
-              <a:rPr lang="en-US" baseline="0" dirty="0" smtClean="0"/>
-              <a:t>minutes. Please tell students the difference between object and vector!</a:t>
+              <a:t>5 minutes. Please tell students the difference between object and vector!</a:t>
             </a:r>
             <a:endParaRPr lang="en-US" dirty="0"/>
           </a:p>
@@ -1913,14 +1909,14 @@
           </a:ln>
           <a:extLst>
             <a:ext uri="{909E8E84-426E-40dd-AFC4-6F175D3DCCD1}">
-              <a14:hiddenFill xmlns="" xmlns:a14="http://schemas.microsoft.com/office/drawing/2010/main">
+              <a14:hiddenFill xmlns:a14="http://schemas.microsoft.com/office/drawing/2010/main" xmlns="">
                 <a:solidFill>
                   <a:srgbClr val="FFFFFF"/>
                 </a:solidFill>
               </a14:hiddenFill>
             </a:ext>
             <a:ext uri="{91240B29-F687-4f45-9708-019B960494DF}">
-              <a14:hiddenLine xmlns="" xmlns:a14="http://schemas.microsoft.com/office/drawing/2010/main" w="9525">
+              <a14:hiddenLine xmlns:a14="http://schemas.microsoft.com/office/drawing/2010/main" xmlns="" w="9525">
                 <a:solidFill>
                   <a:srgbClr val="000000"/>
                 </a:solidFill>
@@ -2379,14 +2375,14 @@
           </a:ln>
           <a:extLst>
             <a:ext uri="{909E8E84-426E-40dd-AFC4-6F175D3DCCD1}">
-              <a14:hiddenFill xmlns="" xmlns:a14="http://schemas.microsoft.com/office/drawing/2010/main">
+              <a14:hiddenFill xmlns:a14="http://schemas.microsoft.com/office/drawing/2010/main" xmlns="">
                 <a:solidFill>
                   <a:srgbClr val="FFFFFF"/>
                 </a:solidFill>
               </a14:hiddenFill>
             </a:ext>
             <a:ext uri="{91240B29-F687-4f45-9708-019B960494DF}">
-              <a14:hiddenLine xmlns="" xmlns:a14="http://schemas.microsoft.com/office/drawing/2010/main" w="9525">
+              <a14:hiddenLine xmlns:a14="http://schemas.microsoft.com/office/drawing/2010/main" xmlns="" w="9525">
                 <a:solidFill>
                   <a:srgbClr val="000000"/>
                 </a:solidFill>
@@ -4032,14 +4028,14 @@
           </a:ln>
           <a:extLst>
             <a:ext uri="{909E8E84-426E-40dd-AFC4-6F175D3DCCD1}">
-              <a14:hiddenFill xmlns="" xmlns:a14="http://schemas.microsoft.com/office/drawing/2010/main">
+              <a14:hiddenFill xmlns:a14="http://schemas.microsoft.com/office/drawing/2010/main" xmlns="">
                 <a:solidFill>
                   <a:srgbClr val="FFFFFF"/>
                 </a:solidFill>
               </a14:hiddenFill>
             </a:ext>
             <a:ext uri="{91240B29-F687-4f45-9708-019B960494DF}">
-              <a14:hiddenLine xmlns="" xmlns:a14="http://schemas.microsoft.com/office/drawing/2010/main" w="9525">
+              <a14:hiddenLine xmlns:a14="http://schemas.microsoft.com/office/drawing/2010/main" xmlns="" w="9525">
                 <a:solidFill>
                   <a:srgbClr val="000000"/>
                 </a:solidFill>
@@ -5601,14 +5597,14 @@
           </a:ln>
           <a:extLst>
             <a:ext uri="{909E8E84-426E-40dd-AFC4-6F175D3DCCD1}">
-              <a14:hiddenFill xmlns="" xmlns:a14="http://schemas.microsoft.com/office/drawing/2010/main">
+              <a14:hiddenFill xmlns:a14="http://schemas.microsoft.com/office/drawing/2010/main" xmlns="">
                 <a:solidFill>
                   <a:srgbClr val="FFFFFF"/>
                 </a:solidFill>
               </a14:hiddenFill>
             </a:ext>
             <a:ext uri="{91240B29-F687-4f45-9708-019B960494DF}">
-              <a14:hiddenLine xmlns="" xmlns:a14="http://schemas.microsoft.com/office/drawing/2010/main" w="9525">
+              <a14:hiddenLine xmlns:a14="http://schemas.microsoft.com/office/drawing/2010/main" xmlns="" w="9525">
                 <a:solidFill>
                   <a:srgbClr val="000000"/>
                 </a:solidFill>
@@ -5810,14 +5806,14 @@
           </a:ln>
           <a:extLst>
             <a:ext uri="{909E8E84-426E-40dd-AFC4-6F175D3DCCD1}">
-              <a14:hiddenFill xmlns="" xmlns:a14="http://schemas.microsoft.com/office/drawing/2010/main">
+              <a14:hiddenFill xmlns:a14="http://schemas.microsoft.com/office/drawing/2010/main" xmlns="">
                 <a:solidFill>
                   <a:srgbClr val="FFFFFF"/>
                 </a:solidFill>
               </a14:hiddenFill>
             </a:ext>
             <a:ext uri="{91240B29-F687-4f45-9708-019B960494DF}">
-              <a14:hiddenLine xmlns="" xmlns:a14="http://schemas.microsoft.com/office/drawing/2010/main" w="9525">
+              <a14:hiddenLine xmlns:a14="http://schemas.microsoft.com/office/drawing/2010/main" xmlns="" w="9525">
                 <a:solidFill>
                   <a:srgbClr val="000000"/>
                 </a:solidFill>
@@ -6118,14 +6114,14 @@
               <ma14:placeholderFlag xmlns:ma14="http://schemas.microsoft.com/office/mac/drawingml/2011/main" val="1"/>
             </a:ext>
             <a:ext uri="{909E8E84-426E-40dd-AFC4-6F175D3DCCD1}">
-              <a14:hiddenFill xmlns="" xmlns:a14="http://schemas.microsoft.com/office/drawing/2010/main">
+              <a14:hiddenFill xmlns:a14="http://schemas.microsoft.com/office/drawing/2010/main" xmlns="">
                 <a:solidFill>
                   <a:srgbClr val="FFFFFF"/>
                 </a:solidFill>
               </a14:hiddenFill>
             </a:ext>
             <a:ext uri="{91240B29-F687-4f45-9708-019B960494DF}">
-              <a14:hiddenLine xmlns="" xmlns:a14="http://schemas.microsoft.com/office/drawing/2010/main" w="9525">
+              <a14:hiddenLine xmlns:a14="http://schemas.microsoft.com/office/drawing/2010/main" xmlns="" w="9525">
                 <a:solidFill>
                   <a:srgbClr val="000000"/>
                 </a:solidFill>
@@ -6352,14 +6348,14 @@
           </a:ln>
           <a:extLst>
             <a:ext uri="{909E8E84-426E-40dd-AFC4-6F175D3DCCD1}">
-              <a14:hiddenFill xmlns="" xmlns:a14="http://schemas.microsoft.com/office/drawing/2010/main">
+              <a14:hiddenFill xmlns:a14="http://schemas.microsoft.com/office/drawing/2010/main" xmlns="">
                 <a:solidFill>
                   <a:srgbClr val="FFFFFF"/>
                 </a:solidFill>
               </a14:hiddenFill>
             </a:ext>
             <a:ext uri="{91240B29-F687-4f45-9708-019B960494DF}">
-              <a14:hiddenLine xmlns="" xmlns:a14="http://schemas.microsoft.com/office/drawing/2010/main" w="9525">
+              <a14:hiddenLine xmlns:a14="http://schemas.microsoft.com/office/drawing/2010/main" xmlns="" w="9525">
                 <a:solidFill>
                   <a:srgbClr val="000000"/>
                 </a:solidFill>
@@ -6884,14 +6880,14 @@
               <ma14:placeholderFlag xmlns:ma14="http://schemas.microsoft.com/office/mac/drawingml/2011/main" val="1"/>
             </a:ext>
             <a:ext uri="{909E8E84-426E-40dd-AFC4-6F175D3DCCD1}">
-              <a14:hiddenFill xmlns="" xmlns:a14="http://schemas.microsoft.com/office/drawing/2010/main">
+              <a14:hiddenFill xmlns:a14="http://schemas.microsoft.com/office/drawing/2010/main" xmlns="">
                 <a:solidFill>
                   <a:srgbClr val="FFFFFF"/>
                 </a:solidFill>
               </a14:hiddenFill>
             </a:ext>
             <a:ext uri="{91240B29-F687-4f45-9708-019B960494DF}">
-              <a14:hiddenLine xmlns="" xmlns:a14="http://schemas.microsoft.com/office/drawing/2010/main" w="9525">
+              <a14:hiddenLine xmlns:a14="http://schemas.microsoft.com/office/drawing/2010/main" xmlns="" w="9525">
                 <a:solidFill>
                   <a:srgbClr val="000000"/>
                 </a:solidFill>
@@ -7120,14 +7116,14 @@
           </a:ln>
           <a:extLst>
             <a:ext uri="{909E8E84-426E-40dd-AFC4-6F175D3DCCD1}">
-              <a14:hiddenFill xmlns="" xmlns:a14="http://schemas.microsoft.com/office/drawing/2010/main">
+              <a14:hiddenFill xmlns:a14="http://schemas.microsoft.com/office/drawing/2010/main" xmlns="">
                 <a:solidFill>
                   <a:srgbClr val="FFFFFF"/>
                 </a:solidFill>
               </a14:hiddenFill>
             </a:ext>
             <a:ext uri="{91240B29-F687-4f45-9708-019B960494DF}">
-              <a14:hiddenLine xmlns="" xmlns:a14="http://schemas.microsoft.com/office/drawing/2010/main" w="9525">
+              <a14:hiddenLine xmlns:a14="http://schemas.microsoft.com/office/drawing/2010/main" xmlns="" w="9525">
                 <a:solidFill>
                   <a:srgbClr val="000000"/>
                 </a:solidFill>

</xml_diff>